<commit_message>
update week1 and week2
</commit_message>
<xml_diff>
--- a/week1/CSharp-1.pptx
+++ b/week1/CSharp-1.pptx
@@ -220,9 +220,6 @@
 <file path=ppt/changesInfos/changesInfo1.xml><?xml version="1.0" encoding="utf-8"?>
 <pc:chgInfo xmlns:a="http://schemas.openxmlformats.org/drawingml/2006/main" xmlns:r="http://schemas.openxmlformats.org/officeDocument/2006/relationships" xmlns:ac="http://schemas.microsoft.com/office/drawing/2013/main/command" xmlns:pc="http://schemas.microsoft.com/office/powerpoint/2013/main/command">
   <pc:docChgLst>
-    <pc:chgData name="Kevin Li" userId="S::kevin.li@georgiancollege.ca::61583ff3-9372-48f6-acff-60541b340f8a" providerId="AD" clId="Web-{3D8557F1-8334-B998-25F7-1938453D8DC7}"/>
-  </pc:docChgLst>
-  <pc:docChgLst>
     <pc:chgData name="Kevin Li" userId="61583ff3-9372-48f6-acff-60541b340f8a" providerId="ADAL" clId="{78B0296A-3066-402C-B724-910C09783ED4}"/>
     <pc:docChg chg="custSel modSld">
       <pc:chgData name="Kevin Li" userId="61583ff3-9372-48f6-acff-60541b340f8a" providerId="ADAL" clId="{78B0296A-3066-402C-B724-910C09783ED4}" dt="2020-05-18T14:16:45.645" v="57" actId="20577"/>
@@ -307,6 +304,9 @@
         </pc:spChg>
       </pc:sldChg>
     </pc:docChg>
+  </pc:docChgLst>
+  <pc:docChgLst>
+    <pc:chgData name="Kevin Li" userId="S::kevin.li@georgiancollege.ca::61583ff3-9372-48f6-acff-60541b340f8a" providerId="AD" clId="Web-{3D8557F1-8334-B998-25F7-1938453D8DC7}"/>
   </pc:docChgLst>
 </pc:chgInfo>
 </file>

</xml_diff>